<commit_message>
update lect 3 and 4
</commit_message>
<xml_diff>
--- a/lectures/Lect03_MultLinRegression.pptx
+++ b/lectures/Lect03_MultLinRegression.pptx
@@ -252,7 +252,7 @@
           <a:p>
             <a:fld id="{B7D6DDD3-D7E9-488B-B626-1E8285E424D8}" type="datetimeFigureOut">
               <a:rPr lang="en-US" smtClean="0"/>
-              <a:t>1/27/2019</a:t>
+              <a:t>9/15/2019</a:t>
             </a:fld>
             <a:endParaRPr lang="en-US"/>
           </a:p>
@@ -517,6 +517,102 @@
     </a:lvl9pPr>
   </p:notesStyle>
 </p:notesMaster>
+</file>
+
+<file path=ppt/notesSlides/notesSlide1.xml><?xml version="1.0" encoding="utf-8"?>
+<p:notes xmlns:a="http://schemas.openxmlformats.org/drawingml/2006/main" xmlns:r="http://schemas.openxmlformats.org/officeDocument/2006/relationships" xmlns:p="http://schemas.openxmlformats.org/presentationml/2006/main">
+  <p:cSld>
+    <p:spTree>
+      <p:nvGrpSpPr>
+        <p:cNvPr id="1" name=""/>
+        <p:cNvGrpSpPr/>
+        <p:nvPr/>
+      </p:nvGrpSpPr>
+      <p:grpSpPr>
+        <a:xfrm>
+          <a:off x="0" y="0"/>
+          <a:ext cx="0" cy="0"/>
+          <a:chOff x="0" y="0"/>
+          <a:chExt cx="0" cy="0"/>
+        </a:xfrm>
+      </p:grpSpPr>
+      <p:sp>
+        <p:nvSpPr>
+          <p:cNvPr id="2" name="Slide Image Placeholder 1"/>
+          <p:cNvSpPr>
+            <a:spLocks noGrp="1" noRot="1" noChangeAspect="1"/>
+          </p:cNvSpPr>
+          <p:nvPr>
+            <p:ph type="sldImg"/>
+          </p:nvPr>
+        </p:nvSpPr>
+        <p:spPr/>
+      </p:sp>
+      <p:sp>
+        <p:nvSpPr>
+          <p:cNvPr id="3" name="Notes Placeholder 2"/>
+          <p:cNvSpPr>
+            <a:spLocks noGrp="1"/>
+          </p:cNvSpPr>
+          <p:nvPr>
+            <p:ph type="body" idx="1"/>
+          </p:nvPr>
+        </p:nvSpPr>
+        <p:spPr/>
+        <p:txBody>
+          <a:bodyPr/>
+          <a:lstStyle/>
+          <a:p>
+            <a:r>
+              <a:rPr lang="en-US" sz="1200" b="0" i="0" kern="1200" dirty="0">
+                <a:solidFill>
+                  <a:schemeClr val="tx1"/>
+                </a:solidFill>
+                <a:effectLst/>
+                <a:latin typeface="+mn-lt"/>
+                <a:ea typeface="+mn-ea"/>
+                <a:cs typeface="+mn-cs"/>
+              </a:rPr>
+              <a:t>The purpose of subtracting the mean from a dataset is to obtain a dataset whose mean is zero.</a:t>
+            </a:r>
+            <a:endParaRPr lang="en-US" dirty="0"/>
+          </a:p>
+        </p:txBody>
+      </p:sp>
+      <p:sp>
+        <p:nvSpPr>
+          <p:cNvPr id="4" name="Slide Number Placeholder 3"/>
+          <p:cNvSpPr>
+            <a:spLocks noGrp="1"/>
+          </p:cNvSpPr>
+          <p:nvPr>
+            <p:ph type="sldNum" sz="quarter" idx="5"/>
+          </p:nvPr>
+        </p:nvSpPr>
+        <p:spPr/>
+        <p:txBody>
+          <a:bodyPr/>
+          <a:lstStyle/>
+          <a:p>
+            <a:fld id="{65CF6084-2C3C-4FE7-B181-D16A3429058A}" type="slidenum">
+              <a:rPr lang="en-US" smtClean="0"/>
+              <a:t>26</a:t>
+            </a:fld>
+            <a:endParaRPr lang="en-US"/>
+          </a:p>
+        </p:txBody>
+      </p:sp>
+    </p:spTree>
+    <p:extLst>
+      <p:ext uri="{BB962C8B-B14F-4D97-AF65-F5344CB8AC3E}">
+        <p14:creationId xmlns:p14="http://schemas.microsoft.com/office/powerpoint/2010/main" val="4219412072"/>
+      </p:ext>
+    </p:extLst>
+  </p:cSld>
+  <p:clrMapOvr>
+    <a:masterClrMapping/>
+  </p:clrMapOvr>
+</p:notes>
 </file>
 
 <file path=ppt/slideLayouts/slideLayout1.xml><?xml version="1.0" encoding="utf-8"?>
@@ -15036,7 +15132,7 @@
 </file>
 
 <file path=ppt/slides/slide23.xml><?xml version="1.0" encoding="utf-8"?>
-<p:sld xmlns:a="http://schemas.openxmlformats.org/drawingml/2006/main" xmlns:r="http://schemas.openxmlformats.org/officeDocument/2006/relationships" xmlns:p="http://schemas.openxmlformats.org/presentationml/2006/main">
+<p:sld xmlns:a="http://schemas.openxmlformats.org/drawingml/2006/main" xmlns:r="http://schemas.openxmlformats.org/officeDocument/2006/relationships" xmlns:p="http://schemas.openxmlformats.org/presentationml/2006/main" show="0">
   <p:cSld>
     <p:spTree>
       <p:nvGrpSpPr>
@@ -16198,7 +16294,15 @@
           <a:p>
             <a:r>
               <a:rPr lang="en-US" dirty="0"/>
-              <a:t>R^2:  Goodness of Fit</a:t>
+              <a:t>R</a:t>
+            </a:r>
+            <a:r>
+              <a:rPr lang="en-US" baseline="30000" dirty="0"/>
+              <a:t>2</a:t>
+            </a:r>
+            <a:r>
+              <a:rPr lang="en-US" dirty="0"/>
+              <a:t>:  Goodness of Fit</a:t>
             </a:r>
           </a:p>
         </p:txBody>
@@ -18138,8 +18242,8 @@
           </a:p>
         </p:txBody>
       </p:sp>
-      <mc:AlternateContent xmlns:mc="http://schemas.openxmlformats.org/markup-compatibility/2006" xmlns:a14="http://schemas.microsoft.com/office/drawing/2010/main">
-        <mc:Choice Requires="a14">
+      <mc:AlternateContent xmlns:mc="http://schemas.openxmlformats.org/markup-compatibility/2006">
+        <mc:Choice xmlns:a14="http://schemas.microsoft.com/office/drawing/2010/main" Requires="a14">
           <p:sp>
             <p:nvSpPr>
               <p:cNvPr id="3" name="Content Placeholder 2"/>
@@ -20142,14 +20246,9 @@
                 </a:endParaRPr>
               </a:p>
               <a:p>
-                <a:r>
-                  <a:rPr lang="en-US" dirty="0">
-                    <a:solidFill>
-                      <a:schemeClr val="tx1"/>
-                    </a:solidFill>
-                  </a:rPr>
-                  <a:t>Proof:  On board</a:t>
-                </a:r>
+                <a:pPr marL="0" indent="0">
+                  <a:buNone/>
+                </a:pPr>
                 <a:endParaRPr lang="en-US" dirty="0"/>
               </a:p>
               <a:p>
@@ -20164,7 +20263,7 @@
             </p:txBody>
           </p:sp>
         </mc:Choice>
-        <mc:Fallback xmlns="">
+        <mc:Fallback>
           <p:sp>
             <p:nvSpPr>
               <p:cNvPr id="3" name="Content Placeholder 2"/>
@@ -20177,7 +20276,7 @@
             </p:nvSpPr>
             <p:spPr>
               <a:blipFill>
-                <a:blip r:embed="rId2"/>
+                <a:blip r:embed="rId3"/>
                 <a:stretch>
                   <a:fillRect l="-1455" t="-1549"/>
                 </a:stretch>
@@ -24870,8 +24969,8 @@
           </a:p>
         </p:txBody>
       </p:sp>
-      <mc:AlternateContent xmlns:mc="http://schemas.openxmlformats.org/markup-compatibility/2006">
-        <mc:Choice xmlns:a14="http://schemas.microsoft.com/office/drawing/2010/main" Requires="a14">
+      <mc:AlternateContent xmlns:mc="http://schemas.openxmlformats.org/markup-compatibility/2006" xmlns:a14="http://schemas.microsoft.com/office/drawing/2010/main">
+        <mc:Choice Requires="a14">
           <p:sp>
             <p:nvSpPr>
               <p:cNvPr id="3" name="Content Placeholder 2">
@@ -25744,7 +25843,7 @@
             </p:txBody>
           </p:sp>
         </mc:Choice>
-        <mc:Fallback>
+        <mc:Fallback xmlns="">
           <p:sp>
             <p:nvSpPr>
               <p:cNvPr id="3" name="Content Placeholder 2">
@@ -26046,8 +26145,8 @@
           </a:p>
         </p:txBody>
       </p:sp>
-      <mc:AlternateContent xmlns:mc="http://schemas.openxmlformats.org/markup-compatibility/2006">
-        <mc:Choice xmlns:a14="http://schemas.microsoft.com/office/drawing/2010/main" Requires="a14">
+      <mc:AlternateContent xmlns:mc="http://schemas.openxmlformats.org/markup-compatibility/2006" xmlns:a14="http://schemas.microsoft.com/office/drawing/2010/main">
+        <mc:Choice Requires="a14">
           <p:sp>
             <p:nvSpPr>
               <p:cNvPr id="3" name="Content Placeholder 2">
@@ -26945,7 +27044,7 @@
             </p:txBody>
           </p:sp>
         </mc:Choice>
-        <mc:Fallback>
+        <mc:Fallback xmlns="">
           <p:sp>
             <p:nvSpPr>
               <p:cNvPr id="3" name="Content Placeholder 2">
@@ -27066,8 +27165,8 @@
           </a:p>
         </p:txBody>
       </p:sp>
-      <mc:AlternateContent xmlns:mc="http://schemas.openxmlformats.org/markup-compatibility/2006">
-        <mc:Choice xmlns:a14="http://schemas.microsoft.com/office/drawing/2010/main" Requires="a14">
+      <mc:AlternateContent xmlns:mc="http://schemas.openxmlformats.org/markup-compatibility/2006" xmlns:a14="http://schemas.microsoft.com/office/drawing/2010/main">
+        <mc:Choice Requires="a14">
           <p:sp>
             <p:nvSpPr>
               <p:cNvPr id="3" name="Content Placeholder 2"/>
@@ -28181,7 +28280,7 @@
             </p:txBody>
           </p:sp>
         </mc:Choice>
-        <mc:Fallback>
+        <mc:Fallback xmlns="">
           <p:sp>
             <p:nvSpPr>
               <p:cNvPr id="3" name="Content Placeholder 2"/>
@@ -28324,8 +28423,8 @@
           </a:p>
         </p:txBody>
       </p:sp>
-      <mc:AlternateContent xmlns:mc="http://schemas.openxmlformats.org/markup-compatibility/2006">
-        <mc:Choice xmlns:a14="http://schemas.microsoft.com/office/drawing/2010/main" Requires="a14">
+      <mc:AlternateContent xmlns:mc="http://schemas.openxmlformats.org/markup-compatibility/2006" xmlns:a14="http://schemas.microsoft.com/office/drawing/2010/main">
+        <mc:Choice Requires="a14">
           <p:sp>
             <p:nvSpPr>
               <p:cNvPr id="3" name="Content Placeholder 2">
@@ -29345,7 +29444,7 @@
                     <m:sSub>
                       <m:sSubPr>
                         <m:ctrlPr>
-                          <a:rPr lang="en-US" b="0" i="0" smtClean="0">
+                          <a:rPr lang="en-US" b="0" i="1" smtClean="0">
                             <a:latin typeface="Cambria Math" panose="02040503050406030204" pitchFamily="18" charset="0"/>
                           </a:rPr>
                         </m:ctrlPr>
@@ -29370,7 +29469,7 @@
                     <m:sSup>
                       <m:sSupPr>
                         <m:ctrlPr>
-                          <a:rPr lang="en-US" b="0" i="0" smtClean="0">
+                          <a:rPr lang="en-US" b="0" i="1" smtClean="0">
                             <a:latin typeface="Cambria Math" panose="02040503050406030204" pitchFamily="18" charset="0"/>
                           </a:rPr>
                         </m:ctrlPr>
@@ -30046,7 +30145,7 @@
             </p:txBody>
           </p:sp>
         </mc:Choice>
-        <mc:Fallback>
+        <mc:Fallback xmlns="">
           <p:sp>
             <p:nvSpPr>
               <p:cNvPr id="3" name="Content Placeholder 2">
@@ -30173,8 +30272,8 @@
           </a:p>
         </p:txBody>
       </p:sp>
-      <mc:AlternateContent xmlns:mc="http://schemas.openxmlformats.org/markup-compatibility/2006">
-        <mc:Choice xmlns:a14="http://schemas.microsoft.com/office/drawing/2010/main" Requires="a14">
+      <mc:AlternateContent xmlns:mc="http://schemas.openxmlformats.org/markup-compatibility/2006" xmlns:a14="http://schemas.microsoft.com/office/drawing/2010/main">
+        <mc:Choice Requires="a14">
           <p:sp>
             <p:nvSpPr>
               <p:cNvPr id="3" name="Content Placeholder 2">
@@ -31313,7 +31412,7 @@
             </p:txBody>
           </p:sp>
         </mc:Choice>
-        <mc:Fallback>
+        <mc:Fallback xmlns="">
           <p:sp>
             <p:nvSpPr>
               <p:cNvPr id="3" name="Content Placeholder 2">
@@ -32489,8 +32588,8 @@
           </a:p>
         </p:txBody>
       </p:sp>
-      <mc:AlternateContent xmlns:mc="http://schemas.openxmlformats.org/markup-compatibility/2006">
-        <mc:Choice xmlns:a14="http://schemas.microsoft.com/office/drawing/2010/main" Requires="a14">
+      <mc:AlternateContent xmlns:mc="http://schemas.openxmlformats.org/markup-compatibility/2006" xmlns:a14="http://schemas.microsoft.com/office/drawing/2010/main">
+        <mc:Choice Requires="a14">
           <p:sp>
             <p:nvSpPr>
               <p:cNvPr id="3" name="Content Placeholder 2"/>
@@ -33611,7 +33710,7 @@
             </p:txBody>
           </p:sp>
         </mc:Choice>
-        <mc:Fallback>
+        <mc:Fallback xmlns="">
           <p:sp>
             <p:nvSpPr>
               <p:cNvPr id="3" name="Content Placeholder 2"/>
@@ -33672,8 +33771,8 @@
           </a:p>
         </p:txBody>
       </p:sp>
-      <mc:AlternateContent xmlns:mc="http://schemas.openxmlformats.org/markup-compatibility/2006">
-        <mc:Choice xmlns:a14="http://schemas.microsoft.com/office/drawing/2010/main" Requires="a14">
+      <mc:AlternateContent xmlns:mc="http://schemas.openxmlformats.org/markup-compatibility/2006" xmlns:a14="http://schemas.microsoft.com/office/drawing/2010/main">
+        <mc:Choice Requires="a14">
           <p:graphicFrame>
             <p:nvGraphicFramePr>
               <p:cNvPr id="5" name="Table 4"/>
@@ -34062,7 +34161,7 @@
             </a:graphic>
           </p:graphicFrame>
         </mc:Choice>
-        <mc:Fallback>
+        <mc:Fallback xmlns="">
           <p:graphicFrame>
             <p:nvGraphicFramePr>
               <p:cNvPr id="5" name="Table 4"/>

</xml_diff>